<commit_message>
Update Discovery session opening slides
</commit_message>
<xml_diff>
--- a/PRESENTATIONS/2021-03-online-f2f/2021-03-17-WoT-F2F-Opening-McCool.pptx
+++ b/PRESENTATIONS/2021-03-online-f2f/2021-03-17-WoT-F2F-Opening-McCool.pptx
@@ -211,7 +211,7 @@
           <a:p>
             <a:fld id="{8389B5DD-0274-BF45-B4C5-62E173E8F634}" type="datetimeFigureOut">
               <a:rPr lang="en-US" smtClean="0"/>
-              <a:t>3/9/21</a:t>
+              <a:t>3/16/21</a:t>
             </a:fld>
             <a:endParaRPr lang="en-US"/>
           </a:p>
@@ -827,7 +827,7 @@
           <a:p>
             <a:fld id="{2F93E591-CC8D-C74E-8EED-098A7FB5E64D}" type="datetime1">
               <a:rPr lang="en-CA" smtClean="0"/>
-              <a:t>2021-03-09</a:t>
+              <a:t>2021-03-16</a:t>
             </a:fld>
             <a:endParaRPr lang="en-US"/>
           </a:p>
@@ -1095,7 +1095,7 @@
           <a:p>
             <a:fld id="{2E1BC118-574D-594E-ABEA-A7C82666C9AB}" type="datetime1">
               <a:rPr lang="en-CA" smtClean="0"/>
-              <a:t>2021-03-09</a:t>
+              <a:t>2021-03-16</a:t>
             </a:fld>
             <a:endParaRPr lang="en-US"/>
           </a:p>
@@ -1461,7 +1461,7 @@
           <a:p>
             <a:fld id="{B929AB1E-7FD9-0A40-B7C0-508CCACB3E9A}" type="datetime1">
               <a:rPr lang="en-CA" smtClean="0"/>
-              <a:t>2021-03-09</a:t>
+              <a:t>2021-03-16</a:t>
             </a:fld>
             <a:endParaRPr lang="en-US"/>
           </a:p>
@@ -1693,7 +1693,7 @@
           <a:p>
             <a:fld id="{5AE8723F-57EA-4C47-97B9-92AFDEEF85DC}" type="datetime1">
               <a:rPr lang="en-CA" smtClean="0"/>
-              <a:t>2021-03-09</a:t>
+              <a:t>2021-03-16</a:t>
             </a:fld>
             <a:endParaRPr lang="en-US"/>
           </a:p>
@@ -2023,7 +2023,7 @@
           <a:p>
             <a:fld id="{B2B00E5D-EC04-AA49-8D52-0FCB6E08F63D}" type="datetime1">
               <a:rPr lang="en-CA" smtClean="0"/>
-              <a:t>2021-03-09</a:t>
+              <a:t>2021-03-16</a:t>
             </a:fld>
             <a:endParaRPr lang="en-US"/>
           </a:p>
@@ -2496,7 +2496,7 @@
           <a:p>
             <a:fld id="{FF90905C-10FF-8047-AA7E-6DC7E8B6AF51}" type="datetime1">
               <a:rPr lang="en-CA" smtClean="0"/>
-              <a:t>2021-03-09</a:t>
+              <a:t>2021-03-16</a:t>
             </a:fld>
             <a:endParaRPr lang="en-US"/>
           </a:p>
@@ -2702,7 +2702,7 @@
           <a:p>
             <a:fld id="{D1CE86E2-4400-D342-BEEC-F9C1ADF6F9F7}" type="datetime1">
               <a:rPr lang="en-CA" smtClean="0"/>
-              <a:t>2021-03-09</a:t>
+              <a:t>2021-03-16</a:t>
             </a:fld>
             <a:endParaRPr lang="en-US"/>
           </a:p>
@@ -2872,7 +2872,7 @@
           <a:p>
             <a:fld id="{74358A08-7221-7F45-8378-69D5559861DD}" type="datetime1">
               <a:rPr lang="en-CA" smtClean="0"/>
-              <a:t>2021-03-09</a:t>
+              <a:t>2021-03-16</a:t>
             </a:fld>
             <a:endParaRPr lang="en-US"/>
           </a:p>
@@ -3244,7 +3244,7 @@
           <a:p>
             <a:fld id="{08C20FDB-303D-8A4E-83B7-226DD88B97BD}" type="datetime1">
               <a:rPr lang="en-CA" smtClean="0"/>
-              <a:t>2021-03-09</a:t>
+              <a:t>2021-03-16</a:t>
             </a:fld>
             <a:endParaRPr lang="en-US"/>
           </a:p>
@@ -3596,7 +3596,7 @@
           <a:p>
             <a:fld id="{0A9EBA37-9D18-D34A-A88D-1B00AA06E95C}" type="datetime1">
               <a:rPr lang="en-CA" smtClean="0"/>
-              <a:t>2021-03-09</a:t>
+              <a:t>2021-03-16</a:t>
             </a:fld>
             <a:endParaRPr lang="en-US"/>
           </a:p>
@@ -3936,7 +3936,7 @@
             <a:fld id="{B73A2E78-F38A-E046-ACDB-668F070D1EF6}" type="datetime1">
               <a:rPr lang="en-CA" smtClean="0"/>
               <a:pPr/>
-              <a:t>2021-03-09</a:t>
+              <a:t>2021-03-16</a:t>
             </a:fld>
             <a:endParaRPr lang="en-US" dirty="0"/>
           </a:p>
@@ -4565,7 +4565,7 @@
           <a:p>
             <a:fld id="{BF92DA42-2970-1B4D-9C1F-77F249CD7467}" type="datetime1">
               <a:rPr lang="en-CA" smtClean="0"/>
-              <a:t>2021-03-09</a:t>
+              <a:t>2021-03-16</a:t>
             </a:fld>
             <a:endParaRPr lang="en-US" dirty="0"/>
           </a:p>
@@ -4829,14 +4829,21 @@
             <a:pPr lvl="1"/>
             <a:r>
               <a:rPr lang="en-CA" dirty="0"/>
-              <a:t>Architecture (1h)</a:t>
+              <a:t>Architecture</a:t>
             </a:r>
           </a:p>
           <a:p>
             <a:pPr lvl="1"/>
             <a:r>
               <a:rPr lang="en-CA" dirty="0"/>
-              <a:t>Profiles (2h)</a:t>
+              <a:t>Profiles</a:t>
+            </a:r>
+          </a:p>
+          <a:p>
+            <a:pPr lvl="1"/>
+            <a:r>
+              <a:rPr lang="en-CA" dirty="0"/>
+              <a:t>ITU-T</a:t>
             </a:r>
           </a:p>
           <a:p>
@@ -4957,93 +4964,132 @@
             </a:r>
             <a:r>
               <a:rPr lang="en-CA" dirty="0"/>
-              <a:t> </a:t>
-            </a:r>
-            <a:br>
+              <a:t> - Discovery</a:t>
+            </a:r>
+            <a:endParaRPr lang="en-US" dirty="0"/>
+          </a:p>
+        </p:txBody>
+      </p:sp>
+      <p:sp>
+        <p:nvSpPr>
+          <p:cNvPr id="3" name="Content Placeholder 2">
+            <a:extLst>
+              <a:ext uri="{FF2B5EF4-FFF2-40B4-BE49-F238E27FC236}">
+                <a16:creationId xmlns:a16="http://schemas.microsoft.com/office/drawing/2014/main" id="{234FF69C-6A82-BF44-BD7D-518DFA442D5B}"/>
+              </a:ext>
+            </a:extLst>
+          </p:cNvPr>
+          <p:cNvSpPr>
+            <a:spLocks noGrp="1"/>
+          </p:cNvSpPr>
+          <p:nvPr>
+            <p:ph idx="1"/>
+          </p:nvPr>
+        </p:nvSpPr>
+        <p:spPr>
+          <a:xfrm>
+            <a:off x="838200" y="1207912"/>
+            <a:ext cx="10515600" cy="4969052"/>
+          </a:xfrm>
+        </p:spPr>
+        <p:txBody>
+          <a:bodyPr/>
+          <a:lstStyle/>
+          <a:p>
+            <a:r>
+              <a:rPr lang="en-CA" b="1" dirty="0"/>
+              <a:t>Opening session: Welcome (Sebastian/McCool; 5+5m)</a:t>
+            </a:r>
+          </a:p>
+          <a:p>
+            <a:r>
+              <a:rPr lang="en-CA" b="1" dirty="0"/>
+              <a:t>0h10m Discovery I (1h30m)</a:t>
+            </a:r>
+          </a:p>
+          <a:p>
+            <a:pPr lvl="1"/>
+            <a:r>
               <a:rPr lang="en-CA" dirty="0"/>
-            </a:br>
+              <a:t>Overview (McCool; 10m)</a:t>
+            </a:r>
+          </a:p>
+          <a:p>
+            <a:pPr lvl="1"/>
             <a:r>
               <a:rPr lang="en-CA" dirty="0"/>
-              <a:t>Discovery</a:t>
-            </a:r>
-            <a:endParaRPr lang="en-US" dirty="0"/>
-          </a:p>
-        </p:txBody>
-      </p:sp>
-      <p:sp>
-        <p:nvSpPr>
-          <p:cNvPr id="3" name="Content Placeholder 2">
-            <a:extLst>
-              <a:ext uri="{FF2B5EF4-FFF2-40B4-BE49-F238E27FC236}">
-                <a16:creationId xmlns:a16="http://schemas.microsoft.com/office/drawing/2014/main" id="{234FF69C-6A82-BF44-BD7D-518DFA442D5B}"/>
-              </a:ext>
-            </a:extLst>
-          </p:cNvPr>
-          <p:cNvSpPr>
-            <a:spLocks noGrp="1"/>
-          </p:cNvSpPr>
-          <p:nvPr>
-            <p:ph idx="1"/>
-          </p:nvPr>
-        </p:nvSpPr>
-        <p:spPr>
-          <a:xfrm>
-            <a:off x="838200" y="1690688"/>
-            <a:ext cx="10515600" cy="4486275"/>
-          </a:xfrm>
-        </p:spPr>
-        <p:txBody>
-          <a:bodyPr/>
-          <a:lstStyle/>
+              <a:t>Introduction (</a:t>
+            </a:r>
+            <a:r>
+              <a:rPr lang="en-CA" dirty="0" err="1"/>
+              <a:t>Toumura</a:t>
+            </a:r>
+            <a:r>
+              <a:rPr lang="en-CA" dirty="0"/>
+              <a:t>; 10m)</a:t>
+            </a:r>
+          </a:p>
+          <a:p>
+            <a:pPr lvl="1"/>
+            <a:r>
+              <a:rPr lang="en-CA" dirty="0"/>
+              <a:t>Self-Description (</a:t>
+            </a:r>
+            <a:r>
+              <a:rPr lang="en-CA" dirty="0" err="1"/>
+              <a:t>Farshid</a:t>
+            </a:r>
+            <a:r>
+              <a:rPr lang="en-CA" dirty="0"/>
+              <a:t>; 10m)</a:t>
+            </a:r>
+          </a:p>
+          <a:p>
+            <a:pPr lvl="1"/>
+            <a:r>
+              <a:rPr lang="en-CA" dirty="0"/>
+              <a:t>Directories (</a:t>
+            </a:r>
+            <a:r>
+              <a:rPr lang="en-CA" dirty="0" err="1"/>
+              <a:t>Farshid</a:t>
+            </a:r>
+            <a:r>
+              <a:rPr lang="en-CA" dirty="0"/>
+              <a:t>; 30m)</a:t>
+            </a:r>
+          </a:p>
+          <a:p>
+            <a:pPr lvl="1"/>
+            <a:r>
+              <a:rPr lang="en-CA" dirty="0"/>
+              <a:t>Queries (Andrea; 30m)</a:t>
+            </a:r>
+          </a:p>
           <a:p>
             <a:r>
               <a:rPr lang="en-CA" b="1" dirty="0"/>
-              <a:t>Opening session: Welcome (Sebastian/McCool; 5m)</a:t>
+              <a:t>1h40m Break (10m)</a:t>
             </a:r>
           </a:p>
           <a:p>
             <a:r>
               <a:rPr lang="en-CA" b="1" dirty="0"/>
-              <a:t>Discovery (2h50m)</a:t>
-            </a:r>
+              <a:t>1h50m Discovery II (1h15m)</a:t>
+            </a:r>
+          </a:p>
+          <a:p>
+            <a:pPr lvl="1"/>
             <a:r>
               <a:rPr lang="en-CA" dirty="0"/>
-              <a:t>[</a:t>
-            </a:r>
-            <a:r>
-              <a:rPr lang="en-CA" dirty="0">
-                <a:hlinkClick r:id="rId2" tooltip="Edit section: Discovery (2h50m)"/>
-              </a:rPr>
-              <a:t>edit</a:t>
-            </a:r>
-            <a:r>
-              <a:rPr lang="en-CA" dirty="0"/>
-              <a:t>]</a:t>
-            </a:r>
-            <a:endParaRPr lang="en-CA" b="1" dirty="0"/>
-          </a:p>
-          <a:p>
-            <a:pPr lvl="1"/>
-            <a:r>
-              <a:rPr lang="en-CA" dirty="0"/>
-              <a:t>Review of Current Discovery Specification (1h30m)</a:t>
-            </a:r>
-          </a:p>
-          <a:p>
-            <a:pPr lvl="1"/>
-            <a:r>
-              <a:rPr lang="en-CA" dirty="0"/>
-              <a:t>Open Issues (McCool; 1h10m)</a:t>
-            </a:r>
-          </a:p>
-          <a:p>
-            <a:pPr lvl="1"/>
-            <a:r>
-              <a:rPr lang="en-CA" dirty="0"/>
-              <a:t>Discussion (10m)</a:t>
-            </a:r>
-          </a:p>
-          <a:p>
+              <a:t>Discussion of Open Issues (45m + 30m)</a:t>
+            </a:r>
+          </a:p>
+          <a:p>
+            <a:r>
+              <a:rPr lang="en-CA" b="1" dirty="0"/>
+              <a:t>2h55m </a:t>
+            </a:r>
             <a:r>
               <a:rPr lang="en-CA" b="1" dirty="0" err="1"/>
               <a:t>Wrapup</a:t>
@@ -5138,7 +5184,7 @@
           <a:p>
             <a:fld id="{B929AB1E-7FD9-0A40-B7C0-508CCACB3E9A}" type="datetime1">
               <a:rPr lang="en-CA" smtClean="0"/>
-              <a:t>2021-03-09</a:t>
+              <a:t>2021-03-16</a:t>
             </a:fld>
             <a:endParaRPr lang="en-US"/>
           </a:p>
@@ -5356,7 +5402,7 @@
           <a:p>
             <a:fld id="{BF92DA42-2970-1B4D-9C1F-77F249CD7467}" type="datetime1">
               <a:rPr lang="en-CA" smtClean="0"/>
-              <a:t>2021-03-09</a:t>
+              <a:t>2021-03-16</a:t>
             </a:fld>
             <a:endParaRPr lang="en-US" dirty="0"/>
           </a:p>

</xml_diff>